<commit_message>
Revisi jawaban No 1
</commit_message>
<xml_diff>
--- a/Latihan 6/implementasi graph dan tree-revisi.pptx
+++ b/Latihan 6/implementasi graph dan tree-revisi.pptx
@@ -12,7 +12,7 @@
     <p:sldId id="257" r:id="rId6"/>
     <p:sldId id="259" r:id="rId7"/>
     <p:sldId id="264" r:id="rId8"/>
-    <p:sldId id="265" r:id="rId9"/>
+    <p:sldId id="274" r:id="rId9"/>
     <p:sldId id="266" r:id="rId10"/>
     <p:sldId id="267" r:id="rId11"/>
     <p:sldId id="268" r:id="rId12"/>
@@ -2877,7 +2877,7 @@
           </a:ln>
           <a:extLst>
             <a:ext uri="{C572A759-6A51-4108-AA02-DFA0A04FC94B}">
-              <ma14:wrappingTextBoxFlag xmlns="" xmlns:m="http://schemas.openxmlformats.org/officeDocument/2006/math" xmlns:a14="http://schemas.microsoft.com/office/drawing/2010/main" xmlns:ma14="http://schemas.microsoft.com/office/mac/drawingml/2011/main" val="1"/>
+              <ma14:wrappingTextBoxFlag xmlns:ma14="http://schemas.microsoft.com/office/mac/drawingml/2011/main" xmlns:a14="http://schemas.microsoft.com/office/drawing/2010/main" xmlns:m="http://schemas.openxmlformats.org/officeDocument/2006/math" xmlns="" val="1"/>
             </a:ext>
           </a:extLst>
         </p:spPr>
@@ -2916,7 +2916,7 @@
           </a:ln>
           <a:extLst>
             <a:ext uri="{C572A759-6A51-4108-AA02-DFA0A04FC94B}">
-              <ma14:wrappingTextBoxFlag xmlns="" xmlns:m="http://schemas.openxmlformats.org/officeDocument/2006/math" xmlns:a14="http://schemas.microsoft.com/office/drawing/2010/main" xmlns:ma14="http://schemas.microsoft.com/office/mac/drawingml/2011/main" val="1"/>
+              <ma14:wrappingTextBoxFlag xmlns:ma14="http://schemas.microsoft.com/office/mac/drawingml/2011/main" xmlns:a14="http://schemas.microsoft.com/office/drawing/2010/main" xmlns:m="http://schemas.openxmlformats.org/officeDocument/2006/math" xmlns="" val="1"/>
             </a:ext>
           </a:extLst>
         </p:spPr>
@@ -3757,7 +3757,7 @@
           </a:prstGeom>
           <a:extLst>
             <a:ext uri="{C572A759-6A51-4108-AA02-DFA0A04FC94B}">
-              <ma14:wrappingTextBoxFlag xmlns="" xmlns:m="http://schemas.openxmlformats.org/officeDocument/2006/math" xmlns:a14="http://schemas.microsoft.com/office/drawing/2010/main" xmlns:ma14="http://schemas.microsoft.com/office/mac/drawingml/2011/main" val="1"/>
+              <ma14:wrappingTextBoxFlag xmlns:ma14="http://schemas.microsoft.com/office/mac/drawingml/2011/main" xmlns:a14="http://schemas.microsoft.com/office/drawing/2010/main" xmlns:m="http://schemas.openxmlformats.org/officeDocument/2006/math" xmlns="" val="1"/>
             </a:ext>
           </a:extLst>
         </p:spPr>
@@ -14890,87 +14890,6 @@
       </p:sp>
       <p:sp>
         <p:nvSpPr>
-          <p:cNvPr id="29" name="Oval 28">
-            <a:extLst>
-              <a:ext uri="{FF2B5EF4-FFF2-40B4-BE49-F238E27FC236}">
-                <a16:creationId xmlns:a16="http://schemas.microsoft.com/office/drawing/2014/main" id="{47768F4C-BCA4-4D67-B146-9E3547BBBC3D}"/>
-              </a:ext>
-            </a:extLst>
-          </p:cNvPr>
-          <p:cNvSpPr/>
-          <p:nvPr/>
-        </p:nvSpPr>
-        <p:spPr>
-          <a:xfrm>
-            <a:off x="20259182" y="9018779"/>
-            <a:ext cx="2232000" cy="1481014"/>
-          </a:xfrm>
-          <a:prstGeom prst="ellipse">
-            <a:avLst/>
-          </a:prstGeom>
-          <a:noFill/>
-          <a:ln w="12700" cap="flat">
-            <a:solidFill>
-              <a:srgbClr val="FF0000"/>
-            </a:solidFill>
-            <a:miter lim="400000"/>
-          </a:ln>
-          <a:effectLst/>
-          <a:sp3d/>
-        </p:spPr>
-        <p:style>
-          <a:lnRef idx="0">
-            <a:scrgbClr r="0" g="0" b="0"/>
-          </a:lnRef>
-          <a:fillRef idx="0">
-            <a:scrgbClr r="0" g="0" b="0"/>
-          </a:fillRef>
-          <a:effectRef idx="0">
-            <a:scrgbClr r="0" g="0" b="0"/>
-          </a:effectRef>
-          <a:fontRef idx="none"/>
-        </p:style>
-        <p:txBody>
-          <a:bodyPr rot="0" spcFirstLastPara="1" vertOverflow="overflow" horzOverflow="overflow" vert="horz" wrap="square" lIns="50800" tIns="50800" rIns="50800" bIns="50800" numCol="1" spcCol="38100" rtlCol="0" anchor="ctr">
-            <a:spAutoFit/>
-          </a:bodyPr>
-          <a:lstStyle/>
-          <a:p>
-            <a:pPr marL="0" marR="0" indent="0" algn="ctr" defTabSz="825500" rtl="0" fontAlgn="auto" latinLnBrk="0" hangingPunct="0">
-              <a:lnSpc>
-                <a:spcPct val="100000"/>
-              </a:lnSpc>
-              <a:spcBef>
-                <a:spcPts val="0"/>
-              </a:spcBef>
-              <a:spcAft>
-                <a:spcPts val="0"/>
-              </a:spcAft>
-              <a:buClrTx/>
-              <a:buSzTx/>
-              <a:buFontTx/>
-              <a:buNone/>
-              <a:tabLst/>
-            </a:pPr>
-            <a:endParaRPr kumimoji="0" lang="en-ID" sz="3200" b="0" i="0" u="none" strike="noStrike" cap="none" spc="0" normalizeH="0" baseline="0">
-              <a:ln>
-                <a:noFill/>
-              </a:ln>
-              <a:solidFill>
-                <a:srgbClr val="FFFFFF"/>
-              </a:solidFill>
-              <a:effectLst/>
-              <a:uFillTx/>
-              <a:latin typeface="Helvetica Neue Medium"/>
-              <a:ea typeface="Helvetica Neue Medium"/>
-              <a:cs typeface="Helvetica Neue Medium"/>
-              <a:sym typeface="Helvetica Neue Medium"/>
-            </a:endParaRPr>
-          </a:p>
-        </p:txBody>
-      </p:sp>
-      <p:sp>
-        <p:nvSpPr>
           <p:cNvPr id="30" name="Oval 29">
             <a:extLst>
               <a:ext uri="{FF2B5EF4-FFF2-40B4-BE49-F238E27FC236}">
@@ -15370,53 +15289,6 @@
       </p:cxnSp>
       <p:cxnSp>
         <p:nvCxnSpPr>
-          <p:cNvPr id="45" name="Straight Arrow Connector 44">
-            <a:extLst>
-              <a:ext uri="{FF2B5EF4-FFF2-40B4-BE49-F238E27FC236}">
-                <a16:creationId xmlns:a16="http://schemas.microsoft.com/office/drawing/2014/main" id="{66E37980-304F-4AF9-8F9C-9ECBEB002286}"/>
-              </a:ext>
-            </a:extLst>
-          </p:cNvPr>
-          <p:cNvCxnSpPr>
-            <a:stCxn id="24" idx="6"/>
-          </p:cNvCxnSpPr>
-          <p:nvPr/>
-        </p:nvCxnSpPr>
-        <p:spPr>
-          <a:xfrm>
-            <a:off x="18774873" y="3874043"/>
-            <a:ext cx="1484309" cy="28756"/>
-          </a:xfrm>
-          <a:prstGeom prst="straightConnector1">
-            <a:avLst/>
-          </a:prstGeom>
-          <a:noFill/>
-          <a:ln w="25400" cap="flat">
-            <a:solidFill>
-              <a:srgbClr val="FF0000"/>
-            </a:solidFill>
-            <a:prstDash val="solid"/>
-            <a:miter lim="400000"/>
-            <a:tailEnd type="triangle"/>
-          </a:ln>
-          <a:effectLst/>
-          <a:sp3d/>
-        </p:spPr>
-        <p:style>
-          <a:lnRef idx="0">
-            <a:scrgbClr r="0" g="0" b="0"/>
-          </a:lnRef>
-          <a:fillRef idx="0">
-            <a:scrgbClr r="0" g="0" b="0"/>
-          </a:fillRef>
-          <a:effectRef idx="0">
-            <a:scrgbClr r="0" g="0" b="0"/>
-          </a:effectRef>
-          <a:fontRef idx="none"/>
-        </p:style>
-      </p:cxnSp>
-      <p:cxnSp>
-        <p:nvCxnSpPr>
           <p:cNvPr id="47" name="Straight Arrow Connector 46">
             <a:extLst>
               <a:ext uri="{FF2B5EF4-FFF2-40B4-BE49-F238E27FC236}">
@@ -15607,22 +15479,23 @@
       </p:cxnSp>
       <p:cxnSp>
         <p:nvCxnSpPr>
-          <p:cNvPr id="56" name="Straight Arrow Connector 55">
+          <p:cNvPr id="62" name="Straight Arrow Connector 61">
             <a:extLst>
               <a:ext uri="{FF2B5EF4-FFF2-40B4-BE49-F238E27FC236}">
-                <a16:creationId xmlns:a16="http://schemas.microsoft.com/office/drawing/2014/main" id="{EBEBF371-E262-4E54-B42A-9C36C4C6ACC8}"/>
+                <a16:creationId xmlns:a16="http://schemas.microsoft.com/office/drawing/2014/main" id="{8EAB308B-160A-45BB-AC79-609F67520EF5}"/>
               </a:ext>
             </a:extLst>
           </p:cNvPr>
           <p:cNvCxnSpPr>
-            <a:stCxn id="30" idx="4"/>
+            <a:stCxn id="23" idx="6"/>
+            <a:endCxn id="25" idx="2"/>
           </p:cNvCxnSpPr>
           <p:nvPr/>
         </p:nvCxnSpPr>
         <p:spPr>
           <a:xfrm>
-            <a:off x="21375182" y="7598506"/>
-            <a:ext cx="0" cy="1420273"/>
+            <a:off x="15082862" y="6826098"/>
+            <a:ext cx="1486908" cy="0"/>
           </a:xfrm>
           <a:prstGeom prst="straightConnector1">
             <a:avLst/>
@@ -15654,23 +15527,23 @@
       </p:cxnSp>
       <p:cxnSp>
         <p:nvCxnSpPr>
-          <p:cNvPr id="62" name="Straight Arrow Connector 61">
+          <p:cNvPr id="14" name="Straight Arrow Connector 13">
             <a:extLst>
               <a:ext uri="{FF2B5EF4-FFF2-40B4-BE49-F238E27FC236}">
-                <a16:creationId xmlns:a16="http://schemas.microsoft.com/office/drawing/2014/main" id="{8EAB308B-160A-45BB-AC79-609F67520EF5}"/>
+                <a16:creationId xmlns:a16="http://schemas.microsoft.com/office/drawing/2014/main" id="{4CFDE2F7-D459-49D9-8368-CEF3C916C709}"/>
               </a:ext>
             </a:extLst>
           </p:cNvPr>
           <p:cNvCxnSpPr>
-            <a:stCxn id="23" idx="6"/>
-            <a:endCxn id="25" idx="2"/>
+            <a:stCxn id="25" idx="7"/>
+            <a:endCxn id="31" idx="3"/>
           </p:cNvCxnSpPr>
           <p:nvPr/>
         </p:nvCxnSpPr>
         <p:spPr>
-          <a:xfrm>
-            <a:off x="15082862" y="6826098"/>
-            <a:ext cx="1486908" cy="0"/>
+          <a:xfrm flipV="1">
+            <a:off x="18474901" y="4411450"/>
+            <a:ext cx="2111150" cy="1891030"/>
           </a:xfrm>
           <a:prstGeom prst="straightConnector1">
             <a:avLst/>
@@ -15733,78 +15606,6 @@
       </p:grpSpPr>
       <p:sp>
         <p:nvSpPr>
-          <p:cNvPr id="6" name="TextBox 5">
-            <a:extLst>
-              <a:ext uri="{FF2B5EF4-FFF2-40B4-BE49-F238E27FC236}">
-                <a16:creationId xmlns:a16="http://schemas.microsoft.com/office/drawing/2014/main" id="{A88A2735-ABFF-944F-83F7-07BE7511759A}"/>
-              </a:ext>
-            </a:extLst>
-          </p:cNvPr>
-          <p:cNvSpPr txBox="1"/>
-          <p:nvPr/>
-        </p:nvSpPr>
-        <p:spPr>
-          <a:xfrm>
-            <a:off x="1863319" y="1469313"/>
-            <a:ext cx="20895220" cy="841256"/>
-          </a:xfrm>
-          <a:prstGeom prst="rect">
-            <a:avLst/>
-          </a:prstGeom>
-          <a:noFill/>
-          <a:ln w="12700" cap="flat">
-            <a:noFill/>
-            <a:miter lim="400000"/>
-          </a:ln>
-          <a:effectLst/>
-          <a:sp3d/>
-        </p:spPr>
-        <p:style>
-          <a:lnRef idx="0">
-            <a:scrgbClr r="0" g="0" b="0"/>
-          </a:lnRef>
-          <a:fillRef idx="0">
-            <a:scrgbClr r="0" g="0" b="0"/>
-          </a:fillRef>
-          <a:effectRef idx="0">
-            <a:scrgbClr r="0" g="0" b="0"/>
-          </a:effectRef>
-          <a:fontRef idx="none"/>
-        </p:style>
-        <p:txBody>
-          <a:bodyPr rot="0" spcFirstLastPara="1" vertOverflow="overflow" horzOverflow="overflow" vert="horz" wrap="square" lIns="50800" tIns="50800" rIns="50800" bIns="50800" numCol="1" spcCol="38100" rtlCol="0" anchor="ctr">
-            <a:spAutoFit/>
-          </a:bodyPr>
-          <a:lstStyle/>
-          <a:p>
-            <a:pPr algn="l"/>
-            <a:r>
-              <a:rPr lang="en-US" sz="4800" noProof="1">
-                <a:solidFill>
-                  <a:sysClr val="windowText" lastClr="000000"/>
-                </a:solidFill>
-              </a:rPr>
-              <a:t>Depok ke Kuningan (Shortest Path Algoritma Dijkstra) dengan Jarak 37980</a:t>
-            </a:r>
-            <a:endParaRPr kumimoji="0" lang="id-ID" sz="4800" b="0" i="0" u="none" strike="noStrike" cap="none" spc="0" normalizeH="0" baseline="0" noProof="1">
-              <a:ln>
-                <a:noFill/>
-              </a:ln>
-              <a:solidFill>
-                <a:sysClr val="windowText" lastClr="000000"/>
-              </a:solidFill>
-              <a:effectLst/>
-              <a:uFillTx/>
-              <a:latin typeface="+mn-lt"/>
-              <a:ea typeface="+mn-ea"/>
-              <a:cs typeface="+mn-cs"/>
-              <a:sym typeface="Helvetica Neue"/>
-            </a:endParaRPr>
-          </a:p>
-        </p:txBody>
-      </p:sp>
-      <p:sp>
-        <p:nvSpPr>
           <p:cNvPr id="4" name="TextBox 3">
             <a:extLst>
               <a:ext uri="{FF2B5EF4-FFF2-40B4-BE49-F238E27FC236}">
@@ -15871,7 +15672,7 @@
                   <a:noFill/>
                 </a:ln>
                 <a:solidFill>
-                  <a:sysClr val="windowText" lastClr="000000"/>
+                  <a:schemeClr val="tx1"/>
                 </a:solidFill>
                 <a:effectLst/>
                 <a:uFillTx/>
@@ -15887,7 +15688,7 @@
                 <a:noFill/>
               </a:ln>
               <a:solidFill>
-                <a:sysClr val="windowText" lastClr="000000"/>
+                <a:schemeClr val="tx1"/>
               </a:solidFill>
               <a:effectLst/>
               <a:uFillTx/>
@@ -15919,9 +15720,7 @@
           <a:prstGeom prst="ellipse">
             <a:avLst/>
           </a:prstGeom>
-          <a:solidFill>
-            <a:schemeClr val="bg1"/>
-          </a:solidFill>
+          <a:noFill/>
           <a:ln w="12700" cap="flat">
             <a:solidFill>
               <a:srgbClr val="FF0000"/>
@@ -16001,10 +15800,10 @@
       </p:sp>
       <p:sp>
         <p:nvSpPr>
-          <p:cNvPr id="7" name="Oval 6">
+          <p:cNvPr id="8" name="Oval 7">
             <a:extLst>
               <a:ext uri="{FF2B5EF4-FFF2-40B4-BE49-F238E27FC236}">
-                <a16:creationId xmlns:a16="http://schemas.microsoft.com/office/drawing/2014/main" id="{E45B3A57-B43C-46D8-BE67-A82435004EA1}"/>
+                <a16:creationId xmlns:a16="http://schemas.microsoft.com/office/drawing/2014/main" id="{91E023E0-2636-4B3B-B273-45455E062C12}"/>
               </a:ext>
             </a:extLst>
           </p:cNvPr>
@@ -16013,15 +15812,13 @@
         </p:nvSpPr>
         <p:spPr>
           <a:xfrm>
-            <a:off x="5525833" y="3109444"/>
+            <a:off x="1833820" y="6063903"/>
             <a:ext cx="2232000" cy="1529199"/>
           </a:xfrm>
           <a:prstGeom prst="ellipse">
             <a:avLst/>
           </a:prstGeom>
-          <a:solidFill>
-            <a:schemeClr val="bg1"/>
-          </a:solidFill>
+          <a:noFill/>
           <a:ln w="12700" cap="flat">
             <a:solidFill>
               <a:srgbClr val="FF0000"/>
@@ -16080,7 +15877,7 @@
                 <a:cs typeface="Helvetica Neue Medium"/>
                 <a:sym typeface="Helvetica Neue Medium"/>
               </a:rPr>
-              <a:t>Bekasi (4360)</a:t>
+              <a:t>Bogor (4370)</a:t>
             </a:r>
             <a:endParaRPr kumimoji="0" lang="en-ID" sz="3200" b="0" i="0" u="none" strike="noStrike" cap="none" spc="0" normalizeH="0" baseline="0" dirty="0">
               <a:ln>
@@ -16101,22 +15898,23 @@
       </p:sp>
       <p:cxnSp>
         <p:nvCxnSpPr>
-          <p:cNvPr id="9" name="Straight Arrow Connector 8">
+          <p:cNvPr id="10" name="Straight Arrow Connector 9">
             <a:extLst>
               <a:ext uri="{FF2B5EF4-FFF2-40B4-BE49-F238E27FC236}">
-                <a16:creationId xmlns:a16="http://schemas.microsoft.com/office/drawing/2014/main" id="{CE6E31F0-2910-42B4-8564-CC230B30E5FA}"/>
+                <a16:creationId xmlns:a16="http://schemas.microsoft.com/office/drawing/2014/main" id="{9BE57811-E014-48A8-8F79-AD8A0273937D}"/>
               </a:ext>
             </a:extLst>
           </p:cNvPr>
           <p:cNvCxnSpPr>
-            <a:cxnSpLocks/>
+            <a:stCxn id="2" idx="4"/>
+            <a:endCxn id="8" idx="0"/>
           </p:cNvCxnSpPr>
           <p:nvPr/>
         </p:nvCxnSpPr>
         <p:spPr>
-          <a:xfrm flipV="1">
-            <a:off x="4095317" y="3893574"/>
-            <a:ext cx="1450077" cy="981"/>
+          <a:xfrm flipH="1">
+            <a:off x="2949820" y="4659155"/>
+            <a:ext cx="29497" cy="1404748"/>
           </a:xfrm>
           <a:prstGeom prst="straightConnector1">
             <a:avLst/>
@@ -16148,10 +15946,10 @@
       </p:cxnSp>
       <p:sp>
         <p:nvSpPr>
-          <p:cNvPr id="11" name="Oval 10">
+          <p:cNvPr id="13" name="Oval 12">
             <a:extLst>
               <a:ext uri="{FF2B5EF4-FFF2-40B4-BE49-F238E27FC236}">
-                <a16:creationId xmlns:a16="http://schemas.microsoft.com/office/drawing/2014/main" id="{B4D4DFB7-E9B0-4D42-9392-C42F127CFED0}"/>
+                <a16:creationId xmlns:a16="http://schemas.microsoft.com/office/drawing/2014/main" id="{101043E7-53BB-4578-9DE8-FF892472AC8C}"/>
               </a:ext>
             </a:extLst>
           </p:cNvPr>
@@ -16160,15 +15958,13 @@
         </p:nvSpPr>
         <p:spPr>
           <a:xfrm>
-            <a:off x="5545394" y="5930869"/>
-            <a:ext cx="2232000" cy="1961991"/>
+            <a:off x="5525833" y="9018362"/>
+            <a:ext cx="2232000" cy="1529199"/>
           </a:xfrm>
           <a:prstGeom prst="ellipse">
             <a:avLst/>
           </a:prstGeom>
-          <a:solidFill>
-            <a:schemeClr val="bg1"/>
-          </a:solidFill>
+          <a:noFill/>
           <a:ln w="12700" cap="flat">
             <a:solidFill>
               <a:srgbClr val="FF0000"/>
@@ -16213,7 +16009,7 @@
               <a:tabLst/>
             </a:pPr>
             <a:r>
-              <a:rPr kumimoji="0" lang="en-US" sz="2800" b="0" i="0" u="none" strike="noStrike" cap="none" spc="0" normalizeH="0" baseline="0" dirty="0" err="1">
+              <a:rPr kumimoji="0" lang="en-US" sz="3200" b="0" i="0" u="none" strike="noStrike" cap="none" spc="0" normalizeH="0" baseline="0" dirty="0" err="1">
                 <a:ln>
                   <a:noFill/>
                 </a:ln>
@@ -16227,10 +16023,10 @@
                 <a:cs typeface="Helvetica Neue Medium"/>
                 <a:sym typeface="Helvetica Neue Medium"/>
               </a:rPr>
-              <a:t>Karawang</a:t>
+              <a:t>Cianjur</a:t>
             </a:r>
             <a:r>
-              <a:rPr lang="en-US" sz="2800" dirty="0">
+              <a:rPr lang="en-US" sz="3200" dirty="0">
                 <a:solidFill>
                   <a:sysClr val="windowText" lastClr="000000"/>
                 </a:solidFill>
@@ -16239,9 +16035,9 @@
                 <a:cs typeface="Helvetica Neue Medium"/>
                 <a:sym typeface="Helvetica Neue Medium"/>
               </a:rPr>
-              <a:t> (10150)</a:t>
+              <a:t> (10680)</a:t>
             </a:r>
-            <a:endParaRPr kumimoji="0" lang="en-ID" sz="2800" b="0" i="0" u="none" strike="noStrike" cap="none" spc="0" normalizeH="0" baseline="0" dirty="0">
+            <a:endParaRPr kumimoji="0" lang="en-ID" sz="3200" b="0" i="0" u="none" strike="noStrike" cap="none" spc="0" normalizeH="0" baseline="0" dirty="0">
               <a:ln>
                 <a:noFill/>
               </a:ln>
@@ -16260,24 +16056,23 @@
       </p:sp>
       <p:cxnSp>
         <p:nvCxnSpPr>
-          <p:cNvPr id="12" name="Straight Arrow Connector 11">
+          <p:cNvPr id="16" name="Straight Arrow Connector 15">
             <a:extLst>
               <a:ext uri="{FF2B5EF4-FFF2-40B4-BE49-F238E27FC236}">
-                <a16:creationId xmlns:a16="http://schemas.microsoft.com/office/drawing/2014/main" id="{ED7B6C38-33C5-43A7-98E2-72B7E83CF90A}"/>
+                <a16:creationId xmlns:a16="http://schemas.microsoft.com/office/drawing/2014/main" id="{CC03597C-35A2-435D-ADF7-34112BE9F84B}"/>
               </a:ext>
             </a:extLst>
           </p:cNvPr>
           <p:cNvCxnSpPr>
-            <a:cxnSpLocks/>
-            <a:stCxn id="7" idx="4"/>
-            <a:endCxn id="11" idx="0"/>
+            <a:stCxn id="8" idx="5"/>
+            <a:endCxn id="13" idx="1"/>
           </p:cNvCxnSpPr>
           <p:nvPr/>
         </p:nvCxnSpPr>
         <p:spPr>
           <a:xfrm>
-            <a:off x="6641833" y="4638643"/>
-            <a:ext cx="19561" cy="1292226"/>
+            <a:off x="3738951" y="7369156"/>
+            <a:ext cx="2113751" cy="1873152"/>
           </a:xfrm>
           <a:prstGeom prst="straightConnector1">
             <a:avLst/>
@@ -16309,10 +16104,10 @@
       </p:cxnSp>
       <p:sp>
         <p:nvSpPr>
-          <p:cNvPr id="21" name="Oval 20">
+          <p:cNvPr id="23" name="Oval 22">
             <a:extLst>
               <a:ext uri="{FF2B5EF4-FFF2-40B4-BE49-F238E27FC236}">
-                <a16:creationId xmlns:a16="http://schemas.microsoft.com/office/drawing/2014/main" id="{70B298AD-67AC-4B34-A525-11F2D537DAAF}"/>
+                <a16:creationId xmlns:a16="http://schemas.microsoft.com/office/drawing/2014/main" id="{6F6FA953-A3A4-4E9E-8E0A-F376B08FE3B4}"/>
               </a:ext>
             </a:extLst>
           </p:cNvPr>
@@ -16321,15 +16116,13 @@
         </p:nvSpPr>
         <p:spPr>
           <a:xfrm>
-            <a:off x="9188348" y="3115916"/>
-            <a:ext cx="2232000" cy="1529199"/>
+            <a:off x="12850862" y="6234616"/>
+            <a:ext cx="2232000" cy="1182965"/>
           </a:xfrm>
           <a:prstGeom prst="ellipse">
             <a:avLst/>
           </a:prstGeom>
-          <a:solidFill>
-            <a:schemeClr val="bg1"/>
-          </a:solidFill>
+          <a:noFill/>
           <a:ln w="12700" cap="flat">
             <a:solidFill>
               <a:srgbClr val="FF0000"/>
@@ -16374,7 +16167,7 @@
               <a:tabLst/>
             </a:pPr>
             <a:r>
-              <a:rPr kumimoji="0" lang="en-US" sz="3200" b="0" i="0" u="none" strike="noStrike" cap="none" spc="0" normalizeH="0" baseline="0" dirty="0">
+              <a:rPr kumimoji="0" lang="en-US" b="0" i="0" u="none" strike="noStrike" cap="none" spc="0" normalizeH="0" baseline="0" dirty="0" err="1">
                 <a:ln>
                   <a:noFill/>
                 </a:ln>
@@ -16388,9 +16181,26 @@
                 <a:cs typeface="Helvetica Neue Medium"/>
                 <a:sym typeface="Helvetica Neue Medium"/>
               </a:rPr>
-              <a:t>Subang (17170)</a:t>
+              <a:t>Sumedang</a:t>
             </a:r>
-            <a:endParaRPr kumimoji="0" lang="en-ID" sz="3200" b="0" i="0" u="none" strike="noStrike" cap="none" spc="0" normalizeH="0" baseline="0" dirty="0">
+            <a:r>
+              <a:rPr kumimoji="0" lang="en-US" b="0" i="0" u="none" strike="noStrike" cap="none" spc="0" normalizeH="0" baseline="0" dirty="0">
+                <a:ln>
+                  <a:noFill/>
+                </a:ln>
+                <a:solidFill>
+                  <a:sysClr val="windowText" lastClr="000000"/>
+                </a:solidFill>
+                <a:effectLst/>
+                <a:uFillTx/>
+                <a:latin typeface="Helvetica Neue Medium"/>
+                <a:ea typeface="Helvetica Neue Medium"/>
+                <a:cs typeface="Helvetica Neue Medium"/>
+                <a:sym typeface="Helvetica Neue Medium"/>
+              </a:rPr>
+              <a:t> (21830)</a:t>
+            </a:r>
+            <a:endParaRPr kumimoji="0" lang="en-ID" b="0" i="0" u="none" strike="noStrike" cap="none" spc="0" normalizeH="0" baseline="0" dirty="0">
               <a:ln>
                 <a:noFill/>
               </a:ln>
@@ -16409,10 +16219,10 @@
       </p:sp>
       <p:sp>
         <p:nvSpPr>
-          <p:cNvPr id="22" name="Oval 21">
+          <p:cNvPr id="25" name="Oval 24">
             <a:extLst>
               <a:ext uri="{FF2B5EF4-FFF2-40B4-BE49-F238E27FC236}">
-                <a16:creationId xmlns:a16="http://schemas.microsoft.com/office/drawing/2014/main" id="{39AB1B74-74D9-43B2-BB99-1E5B4F002602}"/>
+                <a16:creationId xmlns:a16="http://schemas.microsoft.com/office/drawing/2014/main" id="{071502F9-7B98-44D1-B006-45D1A2F32E5F}"/>
               </a:ext>
             </a:extLst>
           </p:cNvPr>
@@ -16421,15 +16231,13 @@
         </p:nvSpPr>
         <p:spPr>
           <a:xfrm>
-            <a:off x="12880359" y="2921804"/>
-            <a:ext cx="2232000" cy="1961991"/>
+            <a:off x="16569770" y="6234616"/>
+            <a:ext cx="2232000" cy="1182965"/>
           </a:xfrm>
           <a:prstGeom prst="ellipse">
             <a:avLst/>
           </a:prstGeom>
-          <a:solidFill>
-            <a:schemeClr val="bg1"/>
-          </a:solidFill>
+          <a:noFill/>
           <a:ln w="12700" cap="flat">
             <a:solidFill>
               <a:srgbClr val="FF0000"/>
@@ -16474,7 +16282,7 @@
               <a:tabLst/>
             </a:pPr>
             <a:r>
-              <a:rPr kumimoji="0" lang="en-US" sz="2800" b="0" i="0" u="none" strike="noStrike" cap="none" spc="0" normalizeH="0" baseline="0" dirty="0" err="1">
+              <a:rPr kumimoji="0" lang="en-US" b="0" i="0" u="none" strike="noStrike" cap="none" spc="0" normalizeH="0" baseline="0" dirty="0" err="1">
                 <a:ln>
                   <a:noFill/>
                 </a:ln>
@@ -16488,10 +16296,10 @@
                 <a:cs typeface="Helvetica Neue Medium"/>
                 <a:sym typeface="Helvetica Neue Medium"/>
               </a:rPr>
-              <a:t>Indramayu</a:t>
+              <a:t>Majalengka</a:t>
             </a:r>
             <a:r>
-              <a:rPr kumimoji="0" lang="en-US" sz="2800" b="0" i="0" u="none" strike="noStrike" cap="none" spc="0" normalizeH="0" baseline="0" dirty="0">
+              <a:rPr kumimoji="0" lang="en-US" b="0" i="0" u="none" strike="noStrike" cap="none" spc="0" normalizeH="0" baseline="0" dirty="0">
                 <a:ln>
                   <a:noFill/>
                 </a:ln>
@@ -16505,9 +16313,9 @@
                 <a:cs typeface="Helvetica Neue Medium"/>
                 <a:sym typeface="Helvetica Neue Medium"/>
               </a:rPr>
-              <a:t> (28240)</a:t>
+              <a:t> (26990)</a:t>
             </a:r>
-            <a:endParaRPr kumimoji="0" lang="en-ID" sz="2800" b="0" i="0" u="none" strike="noStrike" cap="none" spc="0" normalizeH="0" baseline="0" dirty="0">
+            <a:endParaRPr kumimoji="0" lang="en-ID" b="0" i="0" u="none" strike="noStrike" cap="none" spc="0" normalizeH="0" baseline="0" dirty="0">
               <a:ln>
                 <a:noFill/>
               </a:ln>
@@ -16526,10 +16334,10 @@
       </p:sp>
       <p:sp>
         <p:nvSpPr>
-          <p:cNvPr id="24" name="Oval 23">
+          <p:cNvPr id="27" name="Oval 26">
             <a:extLst>
               <a:ext uri="{FF2B5EF4-FFF2-40B4-BE49-F238E27FC236}">
-                <a16:creationId xmlns:a16="http://schemas.microsoft.com/office/drawing/2014/main" id="{EA0200F9-3AA1-4E25-B07F-9ED2EFE82F28}"/>
+                <a16:creationId xmlns:a16="http://schemas.microsoft.com/office/drawing/2014/main" id="{0F3B2F5B-54AD-4D63-B219-E481CD2DC1B7}"/>
               </a:ext>
             </a:extLst>
           </p:cNvPr>
@@ -16538,15 +16346,13 @@
         </p:nvSpPr>
         <p:spPr>
           <a:xfrm>
-            <a:off x="16542873" y="3109444"/>
-            <a:ext cx="2232000" cy="1529199"/>
+            <a:off x="9222760" y="9107706"/>
+            <a:ext cx="2232000" cy="1356082"/>
           </a:xfrm>
           <a:prstGeom prst="ellipse">
             <a:avLst/>
           </a:prstGeom>
-          <a:solidFill>
-            <a:schemeClr val="bg1"/>
-          </a:solidFill>
+          <a:noFill/>
           <a:ln w="12700" cap="flat">
             <a:solidFill>
               <a:srgbClr val="FF0000"/>
@@ -16591,7 +16397,7 @@
               <a:tabLst/>
             </a:pPr>
             <a:r>
-              <a:rPr kumimoji="0" lang="en-US" sz="3200" b="0" i="0" u="none" strike="noStrike" cap="none" spc="0" normalizeH="0" baseline="0" dirty="0">
+              <a:rPr kumimoji="0" lang="en-US" sz="2800" b="0" i="0" u="none" strike="noStrike" cap="none" spc="0" normalizeH="0" baseline="0" dirty="0">
                 <a:ln>
                   <a:noFill/>
                 </a:ln>
@@ -16605,9 +16411,9 @@
                 <a:cs typeface="Helvetica Neue Medium"/>
                 <a:sym typeface="Helvetica Neue Medium"/>
               </a:rPr>
-              <a:t>Cirebon (33710)</a:t>
+              <a:t>Bandung (17180)</a:t>
             </a:r>
-            <a:endParaRPr kumimoji="0" lang="en-ID" sz="3200" b="0" i="0" u="none" strike="noStrike" cap="none" spc="0" normalizeH="0" baseline="0" dirty="0">
+            <a:endParaRPr kumimoji="0" lang="en-ID" sz="2800" b="0" i="0" u="none" strike="noStrike" cap="none" spc="0" normalizeH="0" baseline="0" dirty="0">
               <a:ln>
                 <a:noFill/>
               </a:ln>
@@ -16638,15 +16444,13 @@
         </p:nvSpPr>
         <p:spPr>
           <a:xfrm>
-            <a:off x="20259182" y="2906837"/>
-            <a:ext cx="2232000" cy="1961991"/>
+            <a:off x="20259182" y="3296350"/>
+            <a:ext cx="2232000" cy="1182965"/>
           </a:xfrm>
           <a:prstGeom prst="ellipse">
             <a:avLst/>
           </a:prstGeom>
-          <a:solidFill>
-            <a:schemeClr val="bg1"/>
-          </a:solidFill>
+          <a:noFill/>
           <a:ln w="12700" cap="flat">
             <a:solidFill>
               <a:srgbClr val="FF0000"/>
@@ -16691,7 +16495,7 @@
               <a:tabLst/>
             </a:pPr>
             <a:r>
-              <a:rPr kumimoji="0" lang="en-US" sz="2800" b="0" i="0" u="none" strike="noStrike" cap="none" spc="0" normalizeH="0" baseline="0" dirty="0" err="1">
+              <a:rPr kumimoji="0" lang="en-US" b="0" i="0" u="none" strike="noStrike" cap="none" spc="0" normalizeH="0" baseline="0" dirty="0" err="1">
                 <a:ln>
                   <a:noFill/>
                 </a:ln>
@@ -16708,7 +16512,7 @@
               <a:t>Kuningan</a:t>
             </a:r>
             <a:r>
-              <a:rPr kumimoji="0" lang="en-US" sz="2800" b="0" i="0" u="none" strike="noStrike" cap="none" spc="0" normalizeH="0" baseline="0" dirty="0">
+              <a:rPr kumimoji="0" lang="en-US" b="0" i="0" u="none" strike="noStrike" cap="none" spc="0" normalizeH="0" baseline="0" dirty="0">
                 <a:ln>
                   <a:noFill/>
                 </a:ln>
@@ -16722,9 +16526,9 @@
                 <a:cs typeface="Helvetica Neue Medium"/>
                 <a:sym typeface="Helvetica Neue Medium"/>
               </a:rPr>
-              <a:t> (37980)</a:t>
+              <a:t> (33560)</a:t>
             </a:r>
-            <a:endParaRPr kumimoji="0" lang="en-ID" sz="2800" b="0" i="0" u="none" strike="noStrike" cap="none" spc="0" normalizeH="0" baseline="0" dirty="0">
+            <a:endParaRPr kumimoji="0" lang="en-ID" b="0" i="0" u="none" strike="noStrike" cap="none" spc="0" normalizeH="0" baseline="0" dirty="0">
               <a:ln>
                 <a:noFill/>
               </a:ln>
@@ -16743,24 +16547,23 @@
       </p:sp>
       <p:cxnSp>
         <p:nvCxnSpPr>
-          <p:cNvPr id="35" name="Straight Arrow Connector 34">
+          <p:cNvPr id="37" name="Straight Arrow Connector 36">
             <a:extLst>
               <a:ext uri="{FF2B5EF4-FFF2-40B4-BE49-F238E27FC236}">
-                <a16:creationId xmlns:a16="http://schemas.microsoft.com/office/drawing/2014/main" id="{4E55AF23-66E4-4066-82F8-026AD6C80CB3}"/>
+                <a16:creationId xmlns:a16="http://schemas.microsoft.com/office/drawing/2014/main" id="{D788E335-ADF4-454E-81B7-B1DA46474B20}"/>
               </a:ext>
             </a:extLst>
           </p:cNvPr>
           <p:cNvCxnSpPr>
-            <a:cxnSpLocks/>
-            <a:stCxn id="11" idx="7"/>
-            <a:endCxn id="21" idx="3"/>
+            <a:stCxn id="13" idx="6"/>
+            <a:endCxn id="27" idx="2"/>
           </p:cNvCxnSpPr>
           <p:nvPr/>
         </p:nvCxnSpPr>
         <p:spPr>
-          <a:xfrm flipV="1">
-            <a:off x="7450525" y="4421169"/>
-            <a:ext cx="2064692" cy="1797027"/>
+          <a:xfrm>
+            <a:off x="7757833" y="9782962"/>
+            <a:ext cx="1464927" cy="2785"/>
           </a:xfrm>
           <a:prstGeom prst="straightConnector1">
             <a:avLst/>
@@ -16792,22 +16595,24 @@
       </p:cxnSp>
       <p:cxnSp>
         <p:nvCxnSpPr>
-          <p:cNvPr id="39" name="Straight Arrow Connector 38">
+          <p:cNvPr id="47" name="Straight Arrow Connector 46">
             <a:extLst>
               <a:ext uri="{FF2B5EF4-FFF2-40B4-BE49-F238E27FC236}">
-                <a16:creationId xmlns:a16="http://schemas.microsoft.com/office/drawing/2014/main" id="{17BBFAAF-61BE-4483-917C-DA3D33848108}"/>
+                <a16:creationId xmlns:a16="http://schemas.microsoft.com/office/drawing/2014/main" id="{AEF7FA95-8CEA-481F-B660-ED65C89E9343}"/>
               </a:ext>
             </a:extLst>
           </p:cNvPr>
           <p:cNvCxnSpPr>
-            <a:stCxn id="21" idx="6"/>
+            <a:cxnSpLocks/>
+            <a:stCxn id="27" idx="7"/>
+            <a:endCxn id="23" idx="3"/>
           </p:cNvCxnSpPr>
           <p:nvPr/>
         </p:nvCxnSpPr>
         <p:spPr>
-          <a:xfrm>
-            <a:off x="11420348" y="3880516"/>
-            <a:ext cx="1430514" cy="22283"/>
+          <a:xfrm flipV="1">
+            <a:off x="11127891" y="7244340"/>
+            <a:ext cx="2049840" cy="2061960"/>
           </a:xfrm>
           <a:prstGeom prst="straightConnector1">
             <a:avLst/>
@@ -16839,22 +16644,23 @@
       </p:cxnSp>
       <p:cxnSp>
         <p:nvCxnSpPr>
-          <p:cNvPr id="43" name="Straight Arrow Connector 42">
+          <p:cNvPr id="62" name="Straight Arrow Connector 61">
             <a:extLst>
               <a:ext uri="{FF2B5EF4-FFF2-40B4-BE49-F238E27FC236}">
-                <a16:creationId xmlns:a16="http://schemas.microsoft.com/office/drawing/2014/main" id="{12666396-7B13-4B39-BC1F-7648CFB1AEDE}"/>
+                <a16:creationId xmlns:a16="http://schemas.microsoft.com/office/drawing/2014/main" id="{8EAB308B-160A-45BB-AC79-609F67520EF5}"/>
               </a:ext>
             </a:extLst>
           </p:cNvPr>
           <p:cNvCxnSpPr>
-            <a:stCxn id="22" idx="6"/>
+            <a:stCxn id="23" idx="6"/>
+            <a:endCxn id="25" idx="2"/>
           </p:cNvCxnSpPr>
           <p:nvPr/>
         </p:nvCxnSpPr>
         <p:spPr>
-          <a:xfrm flipV="1">
-            <a:off x="15112359" y="3902799"/>
-            <a:ext cx="1430514" cy="1"/>
+          <a:xfrm>
+            <a:off x="15082862" y="6826099"/>
+            <a:ext cx="1486908" cy="0"/>
           </a:xfrm>
           <a:prstGeom prst="straightConnector1">
             <a:avLst/>
@@ -16886,22 +16692,23 @@
       </p:cxnSp>
       <p:cxnSp>
         <p:nvCxnSpPr>
-          <p:cNvPr id="45" name="Straight Arrow Connector 44">
+          <p:cNvPr id="14" name="Straight Arrow Connector 13">
             <a:extLst>
               <a:ext uri="{FF2B5EF4-FFF2-40B4-BE49-F238E27FC236}">
-                <a16:creationId xmlns:a16="http://schemas.microsoft.com/office/drawing/2014/main" id="{66E37980-304F-4AF9-8F9C-9ECBEB002286}"/>
+                <a16:creationId xmlns:a16="http://schemas.microsoft.com/office/drawing/2014/main" id="{4CFDE2F7-D459-49D9-8368-CEF3C916C709}"/>
               </a:ext>
             </a:extLst>
           </p:cNvPr>
           <p:cNvCxnSpPr>
-            <a:stCxn id="24" idx="6"/>
+            <a:stCxn id="25" idx="7"/>
+            <a:endCxn id="31" idx="3"/>
           </p:cNvCxnSpPr>
           <p:nvPr/>
         </p:nvCxnSpPr>
         <p:spPr>
-          <a:xfrm>
-            <a:off x="18774873" y="3874044"/>
-            <a:ext cx="1484309" cy="28755"/>
+          <a:xfrm flipV="1">
+            <a:off x="18474901" y="4306074"/>
+            <a:ext cx="2111150" cy="2101783"/>
           </a:xfrm>
           <a:prstGeom prst="straightConnector1">
             <a:avLst/>
@@ -16931,10 +16738,82 @@
           <a:fontRef idx="none"/>
         </p:style>
       </p:cxnSp>
+      <p:sp>
+        <p:nvSpPr>
+          <p:cNvPr id="41" name="TextBox 40">
+            <a:extLst>
+              <a:ext uri="{FF2B5EF4-FFF2-40B4-BE49-F238E27FC236}">
+                <a16:creationId xmlns:a16="http://schemas.microsoft.com/office/drawing/2014/main" id="{D60848B7-C99F-4496-946A-4E7389E6D7E7}"/>
+              </a:ext>
+            </a:extLst>
+          </p:cNvPr>
+          <p:cNvSpPr txBox="1"/>
+          <p:nvPr/>
+        </p:nvSpPr>
+        <p:spPr>
+          <a:xfrm>
+            <a:off x="1863319" y="1469313"/>
+            <a:ext cx="20895220" cy="841256"/>
+          </a:xfrm>
+          <a:prstGeom prst="rect">
+            <a:avLst/>
+          </a:prstGeom>
+          <a:noFill/>
+          <a:ln w="12700" cap="flat">
+            <a:noFill/>
+            <a:miter lim="400000"/>
+          </a:ln>
+          <a:effectLst/>
+          <a:sp3d/>
+        </p:spPr>
+        <p:style>
+          <a:lnRef idx="0">
+            <a:scrgbClr r="0" g="0" b="0"/>
+          </a:lnRef>
+          <a:fillRef idx="0">
+            <a:scrgbClr r="0" g="0" b="0"/>
+          </a:fillRef>
+          <a:effectRef idx="0">
+            <a:scrgbClr r="0" g="0" b="0"/>
+          </a:effectRef>
+          <a:fontRef idx="none"/>
+        </p:style>
+        <p:txBody>
+          <a:bodyPr rot="0" spcFirstLastPara="1" vertOverflow="overflow" horzOverflow="overflow" vert="horz" wrap="square" lIns="50800" tIns="50800" rIns="50800" bIns="50800" numCol="1" spcCol="38100" rtlCol="0" anchor="ctr">
+            <a:spAutoFit/>
+          </a:bodyPr>
+          <a:lstStyle/>
+          <a:p>
+            <a:pPr algn="l"/>
+            <a:r>
+              <a:rPr lang="en-US" sz="4800" noProof="1">
+                <a:solidFill>
+                  <a:sysClr val="windowText" lastClr="000000"/>
+                </a:solidFill>
+              </a:rPr>
+              <a:t>Depok ke Kuningan (Shortest Path Algoritma Dijkstra) dengan Jarak 33560</a:t>
+            </a:r>
+            <a:endParaRPr kumimoji="0" lang="id-ID" sz="4800" b="0" i="0" u="none" strike="noStrike" cap="none" spc="0" normalizeH="0" baseline="0" noProof="1">
+              <a:ln>
+                <a:noFill/>
+              </a:ln>
+              <a:solidFill>
+                <a:sysClr val="windowText" lastClr="000000"/>
+              </a:solidFill>
+              <a:effectLst/>
+              <a:uFillTx/>
+              <a:latin typeface="+mn-lt"/>
+              <a:ea typeface="+mn-ea"/>
+              <a:cs typeface="+mn-cs"/>
+              <a:sym typeface="Helvetica Neue"/>
+            </a:endParaRPr>
+          </a:p>
+        </p:txBody>
+      </p:sp>
     </p:spTree>
     <p:extLst>
       <p:ext uri="{BB962C8B-B14F-4D97-AF65-F5344CB8AC3E}">
-        <p14:creationId xmlns:p14="http://schemas.microsoft.com/office/powerpoint/2010/main" val="92584840"/>
+        <p14:creationId xmlns:p14="http://schemas.microsoft.com/office/powerpoint/2010/main" val="1788193032"/>
       </p:ext>
     </p:extLst>
   </p:cSld>
@@ -22794,21 +22673,6 @@
 </file>
 
 <file path=customXml/item1.xml><?xml version="1.0" encoding="utf-8"?>
-<?mso-contentType ?>
-<FormTemplates xmlns="http://schemas.microsoft.com/sharepoint/v3/contenttype/forms">
-  <Display>DocumentLibraryForm</Display>
-  <Edit>DocumentLibraryForm</Edit>
-  <New>DocumentLibraryForm</New>
-</FormTemplates>
-</file>
-
-<file path=customXml/item2.xml><?xml version="1.0" encoding="utf-8"?>
-<p:properties xmlns:p="http://schemas.microsoft.com/office/2006/metadata/properties" xmlns:xsi="http://www.w3.org/2001/XMLSchema-instance" xmlns:pc="http://schemas.microsoft.com/office/infopath/2007/PartnerControls">
-  <documentManagement/>
-</p:properties>
-</file>
-
-<file path=customXml/item3.xml><?xml version="1.0" encoding="utf-8"?>
 <ct:contentTypeSchema xmlns:ct="http://schemas.microsoft.com/office/2006/metadata/contentType" xmlns:ma="http://schemas.microsoft.com/office/2006/metadata/properties/metaAttributes" ct:_="" ma:_="" ma:contentTypeName="Document" ma:contentTypeID="0x010100C95E54C855EC78418D00BFDBA37285E2" ma:contentTypeVersion="10" ma:contentTypeDescription="Create a new document." ma:contentTypeScope="" ma:versionID="6f573b1a45794110d2113225073deebc">
   <xsd:schema xmlns:xsd="http://www.w3.org/2001/XMLSchema" xmlns:xs="http://www.w3.org/2001/XMLSchema" xmlns:p="http://schemas.microsoft.com/office/2006/metadata/properties" xmlns:ns2="e5222402-7b9f-4113-8b8c-ea94d66e8e91" xmlns:ns3="77543c93-e606-407f-9220-765fca0937f2" targetNamespace="http://schemas.microsoft.com/office/2006/metadata/properties" ma:root="true" ma:fieldsID="09add58877d63566cf6918206b064d01" ns2:_="" ns3:_="">
     <xsd:import namespace="e5222402-7b9f-4113-8b8c-ea94d66e8e91"/>
@@ -23011,24 +22875,22 @@
 </ct:contentTypeSchema>
 </file>
 
-<file path=customXml/itemProps1.xml><?xml version="1.0" encoding="utf-8"?>
-<ds:datastoreItem xmlns:ds="http://schemas.openxmlformats.org/officeDocument/2006/customXml" ds:itemID="{7DF2CD51-6DB2-48C4-8BB2-FE46CBA753F9}">
-  <ds:schemaRefs>
-    <ds:schemaRef ds:uri="http://schemas.microsoft.com/sharepoint/v3/contenttype/forms"/>
-  </ds:schemaRefs>
-</ds:datastoreItem>
+<file path=customXml/item2.xml><?xml version="1.0" encoding="utf-8"?>
+<p:properties xmlns:p="http://schemas.microsoft.com/office/2006/metadata/properties" xmlns:xsi="http://www.w3.org/2001/XMLSchema-instance" xmlns:pc="http://schemas.microsoft.com/office/infopath/2007/PartnerControls">
+  <documentManagement/>
+</p:properties>
 </file>
 
-<file path=customXml/itemProps2.xml><?xml version="1.0" encoding="utf-8"?>
-<ds:datastoreItem xmlns:ds="http://schemas.openxmlformats.org/officeDocument/2006/customXml" ds:itemID="{0B24D49F-F276-498D-A24D-B13464F5F0FE}">
-  <ds:schemaRefs>
-    <ds:schemaRef ds:uri="http://schemas.microsoft.com/office/2006/metadata/properties"/>
-    <ds:schemaRef ds:uri="http://schemas.microsoft.com/office/infopath/2007/PartnerControls"/>
-  </ds:schemaRefs>
-</ds:datastoreItem>
+<file path=customXml/item3.xml><?xml version="1.0" encoding="utf-8"?>
+<?mso-contentType ?>
+<FormTemplates xmlns="http://schemas.microsoft.com/sharepoint/v3/contenttype/forms">
+  <Display>DocumentLibraryForm</Display>
+  <Edit>DocumentLibraryForm</Edit>
+  <New>DocumentLibraryForm</New>
+</FormTemplates>
 </file>
 
-<file path=customXml/itemProps3.xml><?xml version="1.0" encoding="utf-8"?>
+<file path=customXml/itemProps1.xml><?xml version="1.0" encoding="utf-8"?>
 <ds:datastoreItem xmlns:ds="http://schemas.openxmlformats.org/officeDocument/2006/customXml" ds:itemID="{EF189A91-6186-401E-99D4-B55CF2D4C04A}">
   <ds:schemaRefs>
     <ds:schemaRef ds:uri="http://schemas.microsoft.com/office/2006/metadata/contentType"/>
@@ -23045,4 +22907,29 @@
     <ds:schemaRef ds:uri="http://schemas.microsoft.com/internal/obd"/>
   </ds:schemaRefs>
 </ds:datastoreItem>
+</file>
+
+<file path=customXml/itemProps2.xml><?xml version="1.0" encoding="utf-8"?>
+<ds:datastoreItem xmlns:ds="http://schemas.openxmlformats.org/officeDocument/2006/customXml" ds:itemID="{0B24D49F-F276-498D-A24D-B13464F5F0FE}">
+  <ds:schemaRefs>
+    <ds:schemaRef ds:uri="http://purl.org/dc/elements/1.1/"/>
+    <ds:schemaRef ds:uri="http://schemas.microsoft.com/office/infopath/2007/PartnerControls"/>
+    <ds:schemaRef ds:uri="http://schemas.microsoft.com/office/2006/metadata/properties"/>
+    <ds:schemaRef ds:uri="http://schemas.microsoft.com/office/2006/documentManagement/types"/>
+    <ds:schemaRef ds:uri="http://www.w3.org/XML/1998/namespace"/>
+    <ds:schemaRef ds:uri="77543c93-e606-407f-9220-765fca0937f2"/>
+    <ds:schemaRef ds:uri="e5222402-7b9f-4113-8b8c-ea94d66e8e91"/>
+    <ds:schemaRef ds:uri="http://schemas.openxmlformats.org/package/2006/metadata/core-properties"/>
+    <ds:schemaRef ds:uri="http://purl.org/dc/dcmitype/"/>
+    <ds:schemaRef ds:uri="http://purl.org/dc/terms/"/>
+  </ds:schemaRefs>
+</ds:datastoreItem>
+</file>
+
+<file path=customXml/itemProps3.xml><?xml version="1.0" encoding="utf-8"?>
+<ds:datastoreItem xmlns:ds="http://schemas.openxmlformats.org/officeDocument/2006/customXml" ds:itemID="{7DF2CD51-6DB2-48C4-8BB2-FE46CBA753F9}">
+  <ds:schemaRefs>
+    <ds:schemaRef ds:uri="http://schemas.microsoft.com/sharepoint/v3/contenttype/forms"/>
+  </ds:schemaRefs>
+</ds:datastoreItem>
 </file>
</xml_diff>

<commit_message>
Update implementasi graph dan tree-revisi.pptx
</commit_message>
<xml_diff>
--- a/Latihan 6/implementasi graph dan tree-revisi.pptx
+++ b/Latihan 6/implementasi graph dan tree-revisi.pptx
@@ -2877,7 +2877,7 @@
           </a:ln>
           <a:extLst>
             <a:ext uri="{C572A759-6A51-4108-AA02-DFA0A04FC94B}">
-              <ma14:wrappingTextBoxFlag xmlns:ma14="http://schemas.microsoft.com/office/mac/drawingml/2011/main" xmlns:a14="http://schemas.microsoft.com/office/drawing/2010/main" xmlns:m="http://schemas.openxmlformats.org/officeDocument/2006/math" xmlns="" val="1"/>
+              <ma14:wrappingTextBoxFlag xmlns="" xmlns:m="http://schemas.openxmlformats.org/officeDocument/2006/math" xmlns:a14="http://schemas.microsoft.com/office/drawing/2010/main" xmlns:ma14="http://schemas.microsoft.com/office/mac/drawingml/2011/main" val="1"/>
             </a:ext>
           </a:extLst>
         </p:spPr>
@@ -2916,7 +2916,7 @@
           </a:ln>
           <a:extLst>
             <a:ext uri="{C572A759-6A51-4108-AA02-DFA0A04FC94B}">
-              <ma14:wrappingTextBoxFlag xmlns:ma14="http://schemas.microsoft.com/office/mac/drawingml/2011/main" xmlns:a14="http://schemas.microsoft.com/office/drawing/2010/main" xmlns:m="http://schemas.openxmlformats.org/officeDocument/2006/math" xmlns="" val="1"/>
+              <ma14:wrappingTextBoxFlag xmlns="" xmlns:m="http://schemas.openxmlformats.org/officeDocument/2006/math" xmlns:a14="http://schemas.microsoft.com/office/drawing/2010/main" xmlns:ma14="http://schemas.microsoft.com/office/mac/drawingml/2011/main" val="1"/>
             </a:ext>
           </a:extLst>
         </p:spPr>
@@ -3757,7 +3757,7 @@
           </a:prstGeom>
           <a:extLst>
             <a:ext uri="{C572A759-6A51-4108-AA02-DFA0A04FC94B}">
-              <ma14:wrappingTextBoxFlag xmlns:ma14="http://schemas.microsoft.com/office/mac/drawingml/2011/main" xmlns:a14="http://schemas.microsoft.com/office/drawing/2010/main" xmlns:m="http://schemas.openxmlformats.org/officeDocument/2006/math" xmlns="" val="1"/>
+              <ma14:wrappingTextBoxFlag xmlns="" xmlns:m="http://schemas.openxmlformats.org/officeDocument/2006/math" xmlns:a14="http://schemas.microsoft.com/office/drawing/2010/main" xmlns:ma14="http://schemas.microsoft.com/office/mac/drawingml/2011/main" val="1"/>
             </a:ext>
           </a:extLst>
         </p:spPr>
@@ -19828,7 +19828,7 @@
                 <a:cs typeface="Helvetica Neue Medium"/>
                 <a:sym typeface="Helvetica Neue Medium"/>
               </a:rPr>
-              <a:t> (24570)</a:t>
+              <a:t> (24590)</a:t>
             </a:r>
             <a:endParaRPr kumimoji="0" lang="en-ID" sz="2800" b="0" i="0" u="none" strike="noStrike" cap="none" spc="0" normalizeH="0" baseline="0" dirty="0">
               <a:ln>
@@ -19943,7 +19943,7 @@
                 <a:cs typeface="Helvetica Neue Medium"/>
                 <a:sym typeface="Helvetica Neue Medium"/>
               </a:rPr>
-              <a:t> (19860)</a:t>
+              <a:t> (19880)</a:t>
             </a:r>
             <a:endParaRPr kumimoji="0" lang="en-ID" sz="3200" b="0" i="0" u="none" strike="noStrike" cap="none" spc="0" normalizeH="0" baseline="0" dirty="0">
               <a:ln>
@@ -22673,6 +22673,21 @@
 </file>
 
 <file path=customXml/item1.xml><?xml version="1.0" encoding="utf-8"?>
+<?mso-contentType ?>
+<FormTemplates xmlns="http://schemas.microsoft.com/sharepoint/v3/contenttype/forms">
+  <Display>DocumentLibraryForm</Display>
+  <Edit>DocumentLibraryForm</Edit>
+  <New>DocumentLibraryForm</New>
+</FormTemplates>
+</file>
+
+<file path=customXml/item2.xml><?xml version="1.0" encoding="utf-8"?>
+<p:properties xmlns:p="http://schemas.microsoft.com/office/2006/metadata/properties" xmlns:xsi="http://www.w3.org/2001/XMLSchema-instance" xmlns:pc="http://schemas.microsoft.com/office/infopath/2007/PartnerControls">
+  <documentManagement/>
+</p:properties>
+</file>
+
+<file path=customXml/item3.xml><?xml version="1.0" encoding="utf-8"?>
 <ct:contentTypeSchema xmlns:ct="http://schemas.microsoft.com/office/2006/metadata/contentType" xmlns:ma="http://schemas.microsoft.com/office/2006/metadata/properties/metaAttributes" ct:_="" ma:_="" ma:contentTypeName="Document" ma:contentTypeID="0x010100C95E54C855EC78418D00BFDBA37285E2" ma:contentTypeVersion="10" ma:contentTypeDescription="Create a new document." ma:contentTypeScope="" ma:versionID="6f573b1a45794110d2113225073deebc">
   <xsd:schema xmlns:xsd="http://www.w3.org/2001/XMLSchema" xmlns:xs="http://www.w3.org/2001/XMLSchema" xmlns:p="http://schemas.microsoft.com/office/2006/metadata/properties" xmlns:ns2="e5222402-7b9f-4113-8b8c-ea94d66e8e91" xmlns:ns3="77543c93-e606-407f-9220-765fca0937f2" targetNamespace="http://schemas.microsoft.com/office/2006/metadata/properties" ma:root="true" ma:fieldsID="09add58877d63566cf6918206b064d01" ns2:_="" ns3:_="">
     <xsd:import namespace="e5222402-7b9f-4113-8b8c-ea94d66e8e91"/>
@@ -22875,36 +22890,10 @@
 </ct:contentTypeSchema>
 </file>
 
-<file path=customXml/item2.xml><?xml version="1.0" encoding="utf-8"?>
-<p:properties xmlns:p="http://schemas.microsoft.com/office/2006/metadata/properties" xmlns:xsi="http://www.w3.org/2001/XMLSchema-instance" xmlns:pc="http://schemas.microsoft.com/office/infopath/2007/PartnerControls">
-  <documentManagement/>
-</p:properties>
-</file>
-
-<file path=customXml/item3.xml><?xml version="1.0" encoding="utf-8"?>
-<?mso-contentType ?>
-<FormTemplates xmlns="http://schemas.microsoft.com/sharepoint/v3/contenttype/forms">
-  <Display>DocumentLibraryForm</Display>
-  <Edit>DocumentLibraryForm</Edit>
-  <New>DocumentLibraryForm</New>
-</FormTemplates>
-</file>
-
 <file path=customXml/itemProps1.xml><?xml version="1.0" encoding="utf-8"?>
-<ds:datastoreItem xmlns:ds="http://schemas.openxmlformats.org/officeDocument/2006/customXml" ds:itemID="{EF189A91-6186-401E-99D4-B55CF2D4C04A}">
+<ds:datastoreItem xmlns:ds="http://schemas.openxmlformats.org/officeDocument/2006/customXml" ds:itemID="{7DF2CD51-6DB2-48C4-8BB2-FE46CBA753F9}">
   <ds:schemaRefs>
-    <ds:schemaRef ds:uri="http://schemas.microsoft.com/office/2006/metadata/contentType"/>
-    <ds:schemaRef ds:uri="http://schemas.microsoft.com/office/2006/metadata/properties/metaAttributes"/>
-    <ds:schemaRef ds:uri="http://www.w3.org/2001/XMLSchema"/>
-    <ds:schemaRef ds:uri="http://schemas.microsoft.com/office/2006/metadata/properties"/>
-    <ds:schemaRef ds:uri="e5222402-7b9f-4113-8b8c-ea94d66e8e91"/>
-    <ds:schemaRef ds:uri="77543c93-e606-407f-9220-765fca0937f2"/>
-    <ds:schemaRef ds:uri="http://schemas.microsoft.com/office/2006/documentManagement/types"/>
-    <ds:schemaRef ds:uri="http://schemas.microsoft.com/office/infopath/2007/PartnerControls"/>
-    <ds:schemaRef ds:uri="http://schemas.openxmlformats.org/package/2006/metadata/core-properties"/>
-    <ds:schemaRef ds:uri="http://purl.org/dc/elements/1.1/"/>
-    <ds:schemaRef ds:uri="http://purl.org/dc/terms/"/>
-    <ds:schemaRef ds:uri="http://schemas.microsoft.com/internal/obd"/>
+    <ds:schemaRef ds:uri="http://schemas.microsoft.com/sharepoint/v3/contenttype/forms"/>
   </ds:schemaRefs>
 </ds:datastoreItem>
 </file>
@@ -22927,9 +22916,20 @@
 </file>
 
 <file path=customXml/itemProps3.xml><?xml version="1.0" encoding="utf-8"?>
-<ds:datastoreItem xmlns:ds="http://schemas.openxmlformats.org/officeDocument/2006/customXml" ds:itemID="{7DF2CD51-6DB2-48C4-8BB2-FE46CBA753F9}">
+<ds:datastoreItem xmlns:ds="http://schemas.openxmlformats.org/officeDocument/2006/customXml" ds:itemID="{EF189A91-6186-401E-99D4-B55CF2D4C04A}">
   <ds:schemaRefs>
-    <ds:schemaRef ds:uri="http://schemas.microsoft.com/sharepoint/v3/contenttype/forms"/>
+    <ds:schemaRef ds:uri="http://schemas.microsoft.com/office/2006/metadata/contentType"/>
+    <ds:schemaRef ds:uri="http://schemas.microsoft.com/office/2006/metadata/properties/metaAttributes"/>
+    <ds:schemaRef ds:uri="http://www.w3.org/2001/XMLSchema"/>
+    <ds:schemaRef ds:uri="http://schemas.microsoft.com/office/2006/metadata/properties"/>
+    <ds:schemaRef ds:uri="e5222402-7b9f-4113-8b8c-ea94d66e8e91"/>
+    <ds:schemaRef ds:uri="77543c93-e606-407f-9220-765fca0937f2"/>
+    <ds:schemaRef ds:uri="http://schemas.microsoft.com/office/2006/documentManagement/types"/>
+    <ds:schemaRef ds:uri="http://schemas.microsoft.com/office/infopath/2007/PartnerControls"/>
+    <ds:schemaRef ds:uri="http://schemas.openxmlformats.org/package/2006/metadata/core-properties"/>
+    <ds:schemaRef ds:uri="http://purl.org/dc/elements/1.1/"/>
+    <ds:schemaRef ds:uri="http://purl.org/dc/terms/"/>
+    <ds:schemaRef ds:uri="http://schemas.microsoft.com/internal/obd"/>
   </ds:schemaRefs>
 </ds:datastoreItem>
 </file>
</xml_diff>